<commit_message>
aggiornamento Sprint3 nella final Presentation e aggiunta considerazioni nella retrospective
</commit_message>
<xml_diff>
--- a/docs/Final Presentation.pptx
+++ b/docs/Final Presentation.pptx
@@ -222,7 +222,7 @@
           <a:p>
             <a:fld id="{80582B21-D3C9-4AB1-B598-3ACC4083F6CC}" type="datetimeFigureOut">
               <a:rPr lang="it-IT" smtClean="0"/>
-              <a:t>03/06/2025</a:t>
+              <a:t>04/06/2025</a:t>
             </a:fld>
             <a:endParaRPr lang="it-IT"/>
           </a:p>
@@ -620,7 +620,7 @@
           <a:p>
             <a:fld id="{F64A8E5F-40E5-4553-9F3C-699F1A5B8145}" type="datetimeFigureOut">
               <a:rPr lang="de-DE" smtClean="0"/>
-              <a:t>03.06.2025</a:t>
+              <a:t>04.06.2025</a:t>
             </a:fld>
             <a:endParaRPr lang="de-DE"/>
           </a:p>
@@ -790,7 +790,7 @@
           <a:p>
             <a:fld id="{F64A8E5F-40E5-4553-9F3C-699F1A5B8145}" type="datetimeFigureOut">
               <a:rPr lang="de-DE" smtClean="0"/>
-              <a:t>03.06.2025</a:t>
+              <a:t>04.06.2025</a:t>
             </a:fld>
             <a:endParaRPr lang="de-DE"/>
           </a:p>
@@ -970,7 +970,7 @@
           <a:p>
             <a:fld id="{F64A8E5F-40E5-4553-9F3C-699F1A5B8145}" type="datetimeFigureOut">
               <a:rPr lang="de-DE" smtClean="0"/>
-              <a:t>03.06.2025</a:t>
+              <a:t>04.06.2025</a:t>
             </a:fld>
             <a:endParaRPr lang="de-DE"/>
           </a:p>
@@ -1140,7 +1140,7 @@
           <a:p>
             <a:fld id="{F64A8E5F-40E5-4553-9F3C-699F1A5B8145}" type="datetimeFigureOut">
               <a:rPr lang="de-DE" smtClean="0"/>
-              <a:t>03.06.2025</a:t>
+              <a:t>04.06.2025</a:t>
             </a:fld>
             <a:endParaRPr lang="de-DE"/>
           </a:p>
@@ -1386,7 +1386,7 @@
           <a:p>
             <a:fld id="{F64A8E5F-40E5-4553-9F3C-699F1A5B8145}" type="datetimeFigureOut">
               <a:rPr lang="de-DE" smtClean="0"/>
-              <a:t>03.06.2025</a:t>
+              <a:t>04.06.2025</a:t>
             </a:fld>
             <a:endParaRPr lang="de-DE"/>
           </a:p>
@@ -1618,7 +1618,7 @@
           <a:p>
             <a:fld id="{F64A8E5F-40E5-4553-9F3C-699F1A5B8145}" type="datetimeFigureOut">
               <a:rPr lang="de-DE" smtClean="0"/>
-              <a:t>03.06.2025</a:t>
+              <a:t>04.06.2025</a:t>
             </a:fld>
             <a:endParaRPr lang="de-DE"/>
           </a:p>
@@ -1985,7 +1985,7 @@
           <a:p>
             <a:fld id="{F64A8E5F-40E5-4553-9F3C-699F1A5B8145}" type="datetimeFigureOut">
               <a:rPr lang="de-DE" smtClean="0"/>
-              <a:t>03.06.2025</a:t>
+              <a:t>04.06.2025</a:t>
             </a:fld>
             <a:endParaRPr lang="de-DE"/>
           </a:p>
@@ -2103,7 +2103,7 @@
           <a:p>
             <a:fld id="{F64A8E5F-40E5-4553-9F3C-699F1A5B8145}" type="datetimeFigureOut">
               <a:rPr lang="de-DE" smtClean="0"/>
-              <a:t>03.06.2025</a:t>
+              <a:t>04.06.2025</a:t>
             </a:fld>
             <a:endParaRPr lang="de-DE"/>
           </a:p>
@@ -2198,7 +2198,7 @@
           <a:p>
             <a:fld id="{F64A8E5F-40E5-4553-9F3C-699F1A5B8145}" type="datetimeFigureOut">
               <a:rPr lang="de-DE" smtClean="0"/>
-              <a:t>03.06.2025</a:t>
+              <a:t>04.06.2025</a:t>
             </a:fld>
             <a:endParaRPr lang="de-DE"/>
           </a:p>
@@ -2475,7 +2475,7 @@
           <a:p>
             <a:fld id="{F64A8E5F-40E5-4553-9F3C-699F1A5B8145}" type="datetimeFigureOut">
               <a:rPr lang="de-DE" smtClean="0"/>
-              <a:t>03.06.2025</a:t>
+              <a:t>04.06.2025</a:t>
             </a:fld>
             <a:endParaRPr lang="de-DE"/>
           </a:p>
@@ -2728,7 +2728,7 @@
           <a:p>
             <a:fld id="{F64A8E5F-40E5-4553-9F3C-699F1A5B8145}" type="datetimeFigureOut">
               <a:rPr lang="de-DE" smtClean="0"/>
-              <a:t>03.06.2025</a:t>
+              <a:t>04.06.2025</a:t>
             </a:fld>
             <a:endParaRPr lang="de-DE"/>
           </a:p>
@@ -2941,7 +2941,7 @@
           <a:p>
             <a:fld id="{F64A8E5F-40E5-4553-9F3C-699F1A5B8145}" type="datetimeFigureOut">
               <a:rPr lang="de-DE" smtClean="0"/>
-              <a:t>03.06.2025</a:t>
+              <a:t>04.06.2025</a:t>
             </a:fld>
             <a:endParaRPr lang="de-DE"/>
           </a:p>
@@ -7175,7 +7175,7 @@
         <p:spPr>
           <a:xfrm>
             <a:off x="416560" y="4259482"/>
-            <a:ext cx="11135360" cy="1785104"/>
+            <a:ext cx="11135360" cy="2123658"/>
           </a:xfrm>
           <a:prstGeom prst="rect">
             <a:avLst/>
@@ -7199,15 +7199,7 @@
             </a:r>
             <a:r>
               <a:rPr lang="it-IT" sz="2200" dirty="0"/>
-              <a:t> programming e comunicazione trasparente. È emersa la necessità di migliorare l’adozione delle coding convention, il coinvolgimento nelle decisioni e la collaborazione sui task. La </a:t>
-            </a:r>
-            <a:r>
-              <a:rPr lang="it-IT" sz="2200" dirty="0" err="1"/>
-              <a:t>retrospective</a:t>
-            </a:r>
-            <a:r>
-              <a:rPr lang="it-IT" sz="2200" dirty="0"/>
-              <a:t> ha evidenziato la necessità di evitare test superficiali, sviluppo isolato e aggiunte non concordate, puntando a maggiore coerenza e lavoro di squadra.</a:t>
+              <a:t> programming e comunicazione trasparente. È emersa la necessità di migliorare l’adozione delle coding convention, il coinvolgimento nelle decisioni e la collaborazione sui task. Si è ribadita l’importanza di evitare test superficiali, sviluppo isolato e modifiche non condivise. È emerso anche il bisogno di un clima più sereno, con meno pressioni e controllo eccessivo. Serve maggiore attenzione agli obiettivi, più confronto nelle scelte e nessuna introduzione di funzionalità non concordate.</a:t>
             </a:r>
           </a:p>
         </p:txBody>
@@ -18423,7 +18415,7 @@
             </a:extLst>
           </p:cNvPr>
           <p:cNvSpPr>
-            <a:spLocks/>
+            <a:spLocks noGrp="1"/>
           </p:cNvSpPr>
           <p:nvPr>
             <p:ph idx="1"/>
@@ -25593,23 +25585,6 @@
 </file>
 
 <file path=customXml/item1.xml><?xml version="1.0" encoding="utf-8"?>
-<?mso-contentType ?>
-<FormTemplates xmlns="http://schemas.microsoft.com/sharepoint/v3/contenttype/forms">
-  <Display>DocumentLibraryForm</Display>
-  <Edit>DocumentLibraryForm</Edit>
-  <New>DocumentLibraryForm</New>
-</FormTemplates>
-</file>
-
-<file path=customXml/item2.xml><?xml version="1.0" encoding="utf-8"?>
-<p:properties xmlns:p="http://schemas.microsoft.com/office/2006/metadata/properties" xmlns:xsi="http://www.w3.org/2001/XMLSchema-instance" xmlns:pc="http://schemas.microsoft.com/office/infopath/2007/PartnerControls">
-  <documentManagement>
-    <_activity xmlns="cad3c75a-58d7-40e3-abd0-865ba3ea7957" xsi:nil="true"/>
-  </documentManagement>
-</p:properties>
-</file>
-
-<file path=customXml/item3.xml><?xml version="1.0" encoding="utf-8"?>
 <ct:contentTypeSchema xmlns:ct="http://schemas.microsoft.com/office/2006/metadata/contentType" xmlns:ma="http://schemas.microsoft.com/office/2006/metadata/properties/metaAttributes" ct:_="" ma:_="" ma:contentTypeName="Documento" ma:contentTypeID="0x0101006D06A881EF84BF4D9C2E0A241D74C9AB" ma:contentTypeVersion="5" ma:contentTypeDescription="Creare un nuovo documento." ma:contentTypeScope="" ma:versionID="6ad53b5fb9ed4d9ca0953b41cd1c771f">
   <xsd:schema xmlns:xsd="http://www.w3.org/2001/XMLSchema" xmlns:xs="http://www.w3.org/2001/XMLSchema" xmlns:p="http://schemas.microsoft.com/office/2006/metadata/properties" xmlns:ns3="cad3c75a-58d7-40e3-abd0-865ba3ea7957" targetNamespace="http://schemas.microsoft.com/office/2006/metadata/properties" ma:root="true" ma:fieldsID="cacddd16a8291ce2bddd10790055ff38" ns3:_="">
     <xsd:import namespace="cad3c75a-58d7-40e3-abd0-865ba3ea7957"/>
@@ -25759,10 +25734,37 @@
 </ct:contentTypeSchema>
 </file>
 
+<file path=customXml/item2.xml><?xml version="1.0" encoding="utf-8"?>
+<p:properties xmlns:p="http://schemas.microsoft.com/office/2006/metadata/properties" xmlns:xsi="http://www.w3.org/2001/XMLSchema-instance" xmlns:pc="http://schemas.microsoft.com/office/infopath/2007/PartnerControls">
+  <documentManagement>
+    <_activity xmlns="cad3c75a-58d7-40e3-abd0-865ba3ea7957" xsi:nil="true"/>
+  </documentManagement>
+</p:properties>
+</file>
+
+<file path=customXml/item3.xml><?xml version="1.0" encoding="utf-8"?>
+<?mso-contentType ?>
+<FormTemplates xmlns="http://schemas.microsoft.com/sharepoint/v3/contenttype/forms">
+  <Display>DocumentLibraryForm</Display>
+  <Edit>DocumentLibraryForm</Edit>
+  <New>DocumentLibraryForm</New>
+</FormTemplates>
+</file>
+
 <file path=customXml/itemProps1.xml><?xml version="1.0" encoding="utf-8"?>
-<ds:datastoreItem xmlns:ds="http://schemas.openxmlformats.org/officeDocument/2006/customXml" ds:itemID="{00D98E2E-2C31-47DC-B3B1-41828B46E309}">
+<ds:datastoreItem xmlns:ds="http://schemas.openxmlformats.org/officeDocument/2006/customXml" ds:itemID="{0F992436-54EC-4242-859C-937829B2E508}">
   <ds:schemaRefs>
-    <ds:schemaRef ds:uri="http://schemas.microsoft.com/sharepoint/v3/contenttype/forms"/>
+    <ds:schemaRef ds:uri="http://schemas.microsoft.com/office/2006/metadata/contentType"/>
+    <ds:schemaRef ds:uri="http://schemas.microsoft.com/office/2006/metadata/properties/metaAttributes"/>
+    <ds:schemaRef ds:uri="http://www.w3.org/2001/XMLSchema"/>
+    <ds:schemaRef ds:uri="http://schemas.microsoft.com/office/2006/metadata/properties"/>
+    <ds:schemaRef ds:uri="cad3c75a-58d7-40e3-abd0-865ba3ea7957"/>
+    <ds:schemaRef ds:uri="http://schemas.microsoft.com/office/2006/documentManagement/types"/>
+    <ds:schemaRef ds:uri="http://schemas.microsoft.com/office/infopath/2007/PartnerControls"/>
+    <ds:schemaRef ds:uri="http://schemas.openxmlformats.org/package/2006/metadata/core-properties"/>
+    <ds:schemaRef ds:uri="http://purl.org/dc/elements/1.1/"/>
+    <ds:schemaRef ds:uri="http://purl.org/dc/terms/"/>
+    <ds:schemaRef ds:uri="http://schemas.microsoft.com/internal/obd"/>
   </ds:schemaRefs>
 </ds:datastoreItem>
 </file>
@@ -25784,19 +25786,9 @@
 </file>
 
 <file path=customXml/itemProps3.xml><?xml version="1.0" encoding="utf-8"?>
-<ds:datastoreItem xmlns:ds="http://schemas.openxmlformats.org/officeDocument/2006/customXml" ds:itemID="{0F992436-54EC-4242-859C-937829B2E508}">
+<ds:datastoreItem xmlns:ds="http://schemas.openxmlformats.org/officeDocument/2006/customXml" ds:itemID="{00D98E2E-2C31-47DC-B3B1-41828B46E309}">
   <ds:schemaRefs>
-    <ds:schemaRef ds:uri="http://schemas.microsoft.com/office/2006/metadata/contentType"/>
-    <ds:schemaRef ds:uri="http://schemas.microsoft.com/office/2006/metadata/properties/metaAttributes"/>
-    <ds:schemaRef ds:uri="http://www.w3.org/2001/XMLSchema"/>
-    <ds:schemaRef ds:uri="http://schemas.microsoft.com/office/2006/metadata/properties"/>
-    <ds:schemaRef ds:uri="cad3c75a-58d7-40e3-abd0-865ba3ea7957"/>
-    <ds:schemaRef ds:uri="http://schemas.microsoft.com/office/2006/documentManagement/types"/>
-    <ds:schemaRef ds:uri="http://schemas.microsoft.com/office/infopath/2007/PartnerControls"/>
-    <ds:schemaRef ds:uri="http://schemas.openxmlformats.org/package/2006/metadata/core-properties"/>
-    <ds:schemaRef ds:uri="http://purl.org/dc/elements/1.1/"/>
-    <ds:schemaRef ds:uri="http://purl.org/dc/terms/"/>
-    <ds:schemaRef ds:uri="http://schemas.microsoft.com/internal/obd"/>
+    <ds:schemaRef ds:uri="http://schemas.microsoft.com/sharepoint/v3/contenttype/forms"/>
   </ds:schemaRefs>
 </ds:datastoreItem>
 </file>
</xml_diff>